<commit_message>
Version final de la presentation
</commit_message>
<xml_diff>
--- a/Documentation/Annexes/I_Presentation/Presntation.pptx
+++ b/Documentation/Annexes/I_Presentation/Presntation.pptx
@@ -205,7 +205,7 @@
           <a:p>
             <a:fld id="{6D3E7067-299E-0741-B0A5-7250BC6DC315}" type="datetimeFigureOut">
               <a:rPr lang="en-US" smtClean="0"/>
-              <a:t>04.09.11</a:t>
+              <a:t>05.09.11</a:t>
             </a:fld>
             <a:endParaRPr lang="de-CH"/>
           </a:p>
@@ -738,7 +738,7 @@
           <a:p>
             <a:fld id="{29CBAB9C-6ADC-DA45-B4F8-FD03AA1248B7}" type="datetimeFigureOut">
               <a:rPr lang="en-US" smtClean="0"/>
-              <a:t>04.09.11</a:t>
+              <a:t>05.09.11</a:t>
             </a:fld>
             <a:endParaRPr lang="de-CH"/>
           </a:p>
@@ -920,7 +920,7 @@
           <a:p>
             <a:fld id="{29CBAB9C-6ADC-DA45-B4F8-FD03AA1248B7}" type="datetimeFigureOut">
               <a:rPr lang="en-US" smtClean="0"/>
-              <a:t>04.09.11</a:t>
+              <a:t>05.09.11</a:t>
             </a:fld>
             <a:endParaRPr lang="de-CH"/>
           </a:p>
@@ -1112,7 +1112,7 @@
           <a:p>
             <a:fld id="{29CBAB9C-6ADC-DA45-B4F8-FD03AA1248B7}" type="datetimeFigureOut">
               <a:rPr lang="en-US" smtClean="0"/>
-              <a:t>04.09.11</a:t>
+              <a:t>05.09.11</a:t>
             </a:fld>
             <a:endParaRPr lang="de-CH"/>
           </a:p>
@@ -1294,7 +1294,7 @@
           <a:p>
             <a:fld id="{29CBAB9C-6ADC-DA45-B4F8-FD03AA1248B7}" type="datetimeFigureOut">
               <a:rPr lang="en-US" smtClean="0"/>
-              <a:t>04.09.11</a:t>
+              <a:t>05.09.11</a:t>
             </a:fld>
             <a:endParaRPr lang="de-CH"/>
           </a:p>
@@ -1552,7 +1552,7 @@
           <a:p>
             <a:fld id="{29CBAB9C-6ADC-DA45-B4F8-FD03AA1248B7}" type="datetimeFigureOut">
               <a:rPr lang="en-US" smtClean="0"/>
-              <a:t>04.09.11</a:t>
+              <a:t>05.09.11</a:t>
             </a:fld>
             <a:endParaRPr lang="de-CH"/>
           </a:p>
@@ -1852,7 +1852,7 @@
           <a:p>
             <a:fld id="{29CBAB9C-6ADC-DA45-B4F8-FD03AA1248B7}" type="datetimeFigureOut">
               <a:rPr lang="en-US" smtClean="0"/>
-              <a:t>04.09.11</a:t>
+              <a:t>05.09.11</a:t>
             </a:fld>
             <a:endParaRPr lang="de-CH"/>
           </a:p>
@@ -2286,7 +2286,7 @@
           <a:p>
             <a:fld id="{29CBAB9C-6ADC-DA45-B4F8-FD03AA1248B7}" type="datetimeFigureOut">
               <a:rPr lang="en-US" smtClean="0"/>
-              <a:t>04.09.11</a:t>
+              <a:t>05.09.11</a:t>
             </a:fld>
             <a:endParaRPr lang="de-CH"/>
           </a:p>
@@ -2416,7 +2416,7 @@
           <a:p>
             <a:fld id="{29CBAB9C-6ADC-DA45-B4F8-FD03AA1248B7}" type="datetimeFigureOut">
               <a:rPr lang="en-US" smtClean="0"/>
-              <a:t>04.09.11</a:t>
+              <a:t>05.09.11</a:t>
             </a:fld>
             <a:endParaRPr lang="de-CH"/>
           </a:p>
@@ -2523,7 +2523,7 @@
           <a:p>
             <a:fld id="{29CBAB9C-6ADC-DA45-B4F8-FD03AA1248B7}" type="datetimeFigureOut">
               <a:rPr lang="en-US" smtClean="0"/>
-              <a:t>04.09.11</a:t>
+              <a:t>05.09.11</a:t>
             </a:fld>
             <a:endParaRPr lang="de-CH"/>
           </a:p>
@@ -2812,7 +2812,7 @@
           <a:p>
             <a:fld id="{29CBAB9C-6ADC-DA45-B4F8-FD03AA1248B7}" type="datetimeFigureOut">
               <a:rPr lang="en-US" smtClean="0"/>
-              <a:t>04.09.11</a:t>
+              <a:t>05.09.11</a:t>
             </a:fld>
             <a:endParaRPr lang="de-CH"/>
           </a:p>
@@ -3077,7 +3077,7 @@
           <a:p>
             <a:fld id="{29CBAB9C-6ADC-DA45-B4F8-FD03AA1248B7}" type="datetimeFigureOut">
               <a:rPr lang="en-US" smtClean="0"/>
-              <a:t>04.09.11</a:t>
+              <a:t>05.09.11</a:t>
             </a:fld>
             <a:endParaRPr lang="de-CH"/>
           </a:p>
@@ -3308,7 +3308,7 @@
           <a:p>
             <a:fld id="{29CBAB9C-6ADC-DA45-B4F8-FD03AA1248B7}" type="datetimeFigureOut">
               <a:rPr lang="en-US" smtClean="0"/>
-              <a:t>04.09.11</a:t>
+              <a:t>05.09.11</a:t>
             </a:fld>
             <a:endParaRPr lang="de-CH"/>
           </a:p>
@@ -4191,7 +4191,7 @@
         <p:spPr>
           <a:xfrm>
             <a:off x="2350234" y="1443683"/>
-            <a:ext cx="5316329" cy="4031873"/>
+            <a:ext cx="5474576" cy="3416320"/>
           </a:xfrm>
           <a:prstGeom prst="rect">
             <a:avLst/>
@@ -4231,12 +4231,20 @@
               <a:buChar char="•"/>
             </a:pPr>
             <a:r>
+              <a:rPr lang="fr-CA" sz="2000" dirty="0" smtClean="0">
+                <a:solidFill>
+                  <a:srgbClr val="27508B"/>
+                </a:solidFill>
+              </a:rPr>
+              <a:t>News , Annuaire </a:t>
+            </a:r>
+            <a:r>
               <a:rPr lang="fr-CA" sz="2000" dirty="0">
                 <a:solidFill>
                   <a:srgbClr val="27508B"/>
                 </a:solidFill>
               </a:rPr>
-              <a:t>Annuaire et </a:t>
+              <a:t>et </a:t>
             </a:r>
             <a:r>
               <a:rPr lang="fr-CA" sz="2000" dirty="0" smtClean="0">
@@ -4291,31 +4299,6 @@
           </a:p>
           <a:p>
             <a:pPr marL="184150" lvl="1" defTabSz="357188"/>
-            <a:endParaRPr lang="fr-CA" sz="2000" dirty="0">
-              <a:solidFill>
-                <a:srgbClr val="27508B"/>
-              </a:solidFill>
-            </a:endParaRPr>
-          </a:p>
-          <a:p>
-            <a:pPr marL="450850" lvl="1" indent="-266700" defTabSz="357188">
-              <a:buFont typeface="Arial"/>
-              <a:buChar char="•"/>
-            </a:pPr>
-            <a:r>
-              <a:rPr lang="fr-CA" sz="2000" dirty="0" smtClean="0">
-                <a:solidFill>
-                  <a:srgbClr val="27508B"/>
-                </a:solidFill>
-              </a:rPr>
-              <a:t>Navigation</a:t>
-            </a:r>
-          </a:p>
-          <a:p>
-            <a:pPr marL="450850" lvl="1" indent="-266700" defTabSz="357188">
-              <a:buFont typeface="Arial"/>
-              <a:buChar char="•"/>
-            </a:pPr>
             <a:endParaRPr lang="fr-CA" sz="2000" dirty="0" smtClean="0">
               <a:solidFill>
                 <a:srgbClr val="27508B"/>
@@ -4333,8 +4316,21 @@
                   <a:srgbClr val="27508B"/>
                 </a:solidFill>
               </a:rPr>
-              <a:t>Carte campus</a:t>
-            </a:r>
+              <a:t>Carte </a:t>
+            </a:r>
+            <a:r>
+              <a:rPr lang="fr-CA" sz="2000" dirty="0" smtClean="0">
+                <a:solidFill>
+                  <a:srgbClr val="27508B"/>
+                </a:solidFill>
+              </a:rPr>
+              <a:t>campus, Calendrier et résultat d’examen</a:t>
+            </a:r>
+            <a:endParaRPr lang="fr-CA" sz="2000" dirty="0" smtClean="0">
+              <a:solidFill>
+                <a:srgbClr val="27508B"/>
+              </a:solidFill>
+            </a:endParaRPr>
           </a:p>
           <a:p>
             <a:pPr marL="450850" lvl="1" indent="-266700" defTabSz="357188">
@@ -6113,11 +6109,6 @@
               </a:rPr>
               <a:t>Extensions</a:t>
             </a:r>
-            <a:endParaRPr lang="fr-FR" sz="1400" dirty="0">
-              <a:solidFill>
-                <a:srgbClr val="4189EF"/>
-              </a:solidFill>
-            </a:endParaRPr>
           </a:p>
         </p:txBody>
       </p:sp>
@@ -6350,11 +6341,6 @@
               </a:rPr>
               <a:t>Difficultés</a:t>
             </a:r>
-            <a:endParaRPr lang="fr-FR" sz="1400" dirty="0">
-              <a:solidFill>
-                <a:srgbClr val="C1DAEF"/>
-              </a:solidFill>
-            </a:endParaRPr>
           </a:p>
         </p:txBody>
       </p:sp>
@@ -6415,15 +6401,7 @@
                   <a:srgbClr val="27508B"/>
                 </a:solidFill>
               </a:rPr>
-              <a:t>Nouvelles fonctionnalités: O</a:t>
-            </a:r>
-            <a:r>
-              <a:rPr lang="fr-CA" sz="2400" dirty="0" smtClean="0">
-                <a:solidFill>
-                  <a:srgbClr val="27508B"/>
-                </a:solidFill>
-              </a:rPr>
-              <a:t>ù es-tu? Menu des cafétérias, etc…</a:t>
+              <a:t>Nouvelles fonctionnalités: Où es-tu? Menu des cafétérias, etc…</a:t>
             </a:r>
           </a:p>
           <a:p>
@@ -6475,11 +6453,6 @@
               </a:rPr>
               <a:t>Utilisation par d’autres universités.</a:t>
             </a:r>
-            <a:endParaRPr lang="fr-CA" sz="2400" dirty="0" smtClean="0">
-              <a:solidFill>
-                <a:srgbClr val="27508B"/>
-              </a:solidFill>
-            </a:endParaRPr>
           </a:p>
           <a:p>
             <a:pPr marL="342900" indent="-342900">
@@ -7039,11 +7012,6 @@
               </a:rPr>
               <a:t>Extensions</a:t>
             </a:r>
-            <a:endParaRPr lang="fr-FR" sz="1400" dirty="0">
-              <a:solidFill>
-                <a:srgbClr val="C1DAEF"/>
-              </a:solidFill>
-            </a:endParaRPr>
           </a:p>
         </p:txBody>
       </p:sp>
@@ -7139,11 +7107,6 @@
               </a:rPr>
               <a:t>Difficultés</a:t>
             </a:r>
-            <a:endParaRPr lang="fr-FR" sz="1400" dirty="0">
-              <a:solidFill>
-                <a:srgbClr val="C1DAEF"/>
-              </a:solidFill>
-            </a:endParaRPr>
           </a:p>
         </p:txBody>
       </p:sp>
@@ -7179,15 +7142,7 @@
                   <a:srgbClr val="27508B"/>
                 </a:solidFill>
               </a:rPr>
-              <a:t>Objectifs atteints</a:t>
-            </a:r>
-            <a:r>
-              <a:rPr lang="fr-CA" sz="2400" dirty="0" smtClean="0">
-                <a:solidFill>
-                  <a:srgbClr val="27508B"/>
-                </a:solidFill>
-              </a:rPr>
-              <a:t>.</a:t>
+              <a:t>Objectifs atteints.</a:t>
             </a:r>
           </a:p>
           <a:p>
@@ -7256,12 +7211,12 @@
               <a:buChar char="•"/>
             </a:pPr>
             <a:r>
-              <a:rPr lang="fr-CA" sz="2400" dirty="0" err="1" smtClean="0">
+              <a:rPr lang="fr-CA" sz="2400" dirty="0" smtClean="0">
                 <a:solidFill>
                   <a:srgbClr val="27508B"/>
                 </a:solidFill>
               </a:rPr>
-              <a:t>Evolution</a:t>
+              <a:t>Évolution </a:t>
             </a:r>
             <a:r>
               <a:rPr lang="fr-CA" sz="2400" dirty="0" smtClean="0">
@@ -7269,7 +7224,7 @@
                   <a:srgbClr val="27508B"/>
                 </a:solidFill>
               </a:rPr>
-              <a:t> future facilitée.</a:t>
+              <a:t>future facilitée.</a:t>
             </a:r>
           </a:p>
           <a:p>
@@ -7546,7 +7501,7 @@
         <p:spPr>
           <a:xfrm>
             <a:off x="1296877" y="1606140"/>
-            <a:ext cx="7772400" cy="1470025"/>
+            <a:ext cx="2686305" cy="1470025"/>
           </a:xfrm>
           <a:prstGeom prst="rect">
             <a:avLst/>
@@ -7554,7 +7509,7 @@
         </p:spPr>
         <p:txBody>
           <a:bodyPr vert="horz" lIns="91440" tIns="45720" rIns="91440" bIns="45720" rtlCol="0" anchor="ctr">
-            <a:normAutofit fontScale="85000" lnSpcReduction="20000"/>
+            <a:normAutofit fontScale="25000" lnSpcReduction="20000"/>
           </a:bodyPr>
           <a:lstStyle>
             <a:lvl1pPr algn="ctr" defTabSz="457200" rtl="0" eaLnBrk="1" latinLnBrk="0" hangingPunct="1">
@@ -7574,26 +7529,7 @@
           </a:lstStyle>
           <a:p>
             <a:pPr algn="l"/>
-            <a:r>
-              <a:rPr lang="de-CH" dirty="0" err="1" smtClean="0">
-                <a:solidFill>
-                  <a:schemeClr val="bg1"/>
-                </a:solidFill>
-              </a:rPr>
-              <a:t>Questions</a:t>
-            </a:r>
-            <a:r>
-              <a:rPr lang="de-CH" dirty="0" smtClean="0">
-                <a:solidFill>
-                  <a:schemeClr val="bg1"/>
-                </a:solidFill>
-              </a:rPr>
-              <a:t> ?</a:t>
-            </a:r>
-          </a:p>
-          <a:p>
-            <a:pPr algn="l"/>
-            <a:endParaRPr lang="de-CH" dirty="0">
+            <a:endParaRPr lang="de-CH" dirty="0" smtClean="0">
               <a:solidFill>
                 <a:schemeClr val="bg1"/>
               </a:solidFill>
@@ -7602,14 +7538,81 @@
           <a:p>
             <a:pPr algn="l"/>
             <a:r>
-              <a:rPr lang="de-CH" dirty="0" smtClean="0">
+              <a:rPr lang="de-CH" sz="9600" dirty="0" err="1" smtClean="0">
                 <a:solidFill>
                   <a:schemeClr val="bg1"/>
                 </a:solidFill>
               </a:rPr>
+              <a:t>Remerciement</a:t>
+            </a:r>
+            <a:r>
+              <a:rPr lang="de-CH" sz="9600" dirty="0" smtClean="0">
+                <a:solidFill>
+                  <a:schemeClr val="bg1"/>
+                </a:solidFill>
+              </a:rPr>
+              <a:t>. </a:t>
+            </a:r>
+            <a:endParaRPr lang="de-CH" sz="9600" dirty="0" smtClean="0">
+              <a:solidFill>
+                <a:schemeClr val="bg1"/>
+              </a:solidFill>
+            </a:endParaRPr>
+          </a:p>
+          <a:p>
+            <a:pPr algn="l"/>
+            <a:endParaRPr lang="de-CH" sz="9600" dirty="0" smtClean="0">
+              <a:solidFill>
+                <a:schemeClr val="bg1"/>
+              </a:solidFill>
+            </a:endParaRPr>
+          </a:p>
+          <a:p>
+            <a:pPr algn="l"/>
+            <a:r>
+              <a:rPr lang="de-CH" sz="9600" dirty="0" err="1" smtClean="0">
+                <a:solidFill>
+                  <a:schemeClr val="bg1"/>
+                </a:solidFill>
+              </a:rPr>
+              <a:t>Questions</a:t>
+            </a:r>
+            <a:r>
+              <a:rPr lang="de-CH" sz="9600" dirty="0" smtClean="0">
+                <a:solidFill>
+                  <a:schemeClr val="bg1"/>
+                </a:solidFill>
+              </a:rPr>
+              <a:t> </a:t>
+            </a:r>
+            <a:r>
+              <a:rPr lang="de-CH" sz="9600" dirty="0" smtClean="0">
+                <a:solidFill>
+                  <a:schemeClr val="bg1"/>
+                </a:solidFill>
+              </a:rPr>
+              <a:t>?</a:t>
+            </a:r>
+          </a:p>
+          <a:p>
+            <a:pPr algn="l"/>
+            <a:endParaRPr lang="de-CH" sz="9600" dirty="0">
+              <a:solidFill>
+                <a:schemeClr val="bg1"/>
+              </a:solidFill>
+            </a:endParaRPr>
+          </a:p>
+          <a:p>
+            <a:pPr algn="l"/>
+            <a:r>
+              <a:rPr lang="de-CH" sz="9600" dirty="0" smtClean="0">
+                <a:solidFill>
+                  <a:schemeClr val="bg1"/>
+                </a:solidFill>
+              </a:rPr>
               <a:t>Remarques ?</a:t>
             </a:r>
-            <a:endParaRPr lang="de-CH" dirty="0">
+            <a:endParaRPr lang="de-CH" sz="9600" dirty="0">
               <a:solidFill>
                 <a:schemeClr val="bg1"/>
               </a:solidFill>
@@ -7702,6 +7705,97 @@
           </a:p>
         </p:txBody>
       </p:sp>
+      <p:sp>
+        <p:nvSpPr>
+          <p:cNvPr id="5" name="Rectangle 4"/>
+          <p:cNvSpPr/>
+          <p:nvPr/>
+        </p:nvSpPr>
+        <p:spPr>
+          <a:xfrm>
+            <a:off x="-317510" y="5500009"/>
+            <a:ext cx="10432466" cy="1403352"/>
+          </a:xfrm>
+          <a:prstGeom prst="rect">
+            <a:avLst/>
+          </a:prstGeom>
+          <a:ln w="3175" cmpd="sng">
+            <a:solidFill>
+              <a:srgbClr val="999C9E"/>
+            </a:solidFill>
+          </a:ln>
+        </p:spPr>
+        <p:style>
+          <a:lnRef idx="2">
+            <a:schemeClr val="dk1"/>
+          </a:lnRef>
+          <a:fillRef idx="1">
+            <a:schemeClr val="lt1"/>
+          </a:fillRef>
+          <a:effectRef idx="0">
+            <a:schemeClr val="dk1"/>
+          </a:effectRef>
+          <a:fontRef idx="minor">
+            <a:schemeClr val="dk1"/>
+          </a:fontRef>
+        </p:style>
+        <p:txBody>
+          <a:bodyPr vert="horz" rtlCol="0" anchor="ctr"/>
+          <a:lstStyle/>
+          <a:p>
+            <a:pPr algn="ctr"/>
+            <a:endParaRPr lang="fr-CA" dirty="0" smtClean="0"/>
+          </a:p>
+        </p:txBody>
+      </p:sp>
+      <p:pic>
+        <p:nvPicPr>
+          <p:cNvPr id="7" name="Picture 6"/>
+          <p:cNvPicPr>
+            <a:picLocks noChangeAspect="1"/>
+          </p:cNvPicPr>
+          <p:nvPr/>
+        </p:nvPicPr>
+        <p:blipFill>
+          <a:blip r:embed="rId3"/>
+          <a:stretch>
+            <a:fillRect/>
+          </a:stretch>
+        </p:blipFill>
+        <p:spPr>
+          <a:xfrm>
+            <a:off x="152400" y="5636089"/>
+            <a:ext cx="4121177" cy="793445"/>
+          </a:xfrm>
+          <a:prstGeom prst="rect">
+            <a:avLst/>
+          </a:prstGeom>
+        </p:spPr>
+      </p:pic>
+      <p:pic>
+        <p:nvPicPr>
+          <p:cNvPr id="9" name="Picture 8"/>
+          <p:cNvPicPr>
+            <a:picLocks noChangeAspect="1"/>
+          </p:cNvPicPr>
+          <p:nvPr/>
+        </p:nvPicPr>
+        <p:blipFill>
+          <a:blip r:embed="rId4"/>
+          <a:stretch>
+            <a:fillRect/>
+          </a:stretch>
+        </p:blipFill>
+        <p:spPr>
+          <a:xfrm>
+            <a:off x="4581403" y="5712555"/>
+            <a:ext cx="4337512" cy="640513"/>
+          </a:xfrm>
+          <a:prstGeom prst="rect">
+            <a:avLst/>
+          </a:prstGeom>
+        </p:spPr>
+      </p:pic>
     </p:spTree>
     <p:extLst>
       <p:ext uri="{BB962C8B-B14F-4D97-AF65-F5344CB8AC3E}">
@@ -8094,7 +8188,7 @@
         </p:nvSpPr>
         <p:spPr>
           <a:xfrm>
-            <a:off x="697884" y="3390783"/>
+            <a:off x="695203" y="6889054"/>
             <a:ext cx="6699871" cy="1077218"/>
           </a:xfrm>
           <a:prstGeom prst="rect">
@@ -8132,39 +8226,7 @@
                   <a:srgbClr val="FFFFFF"/>
                 </a:solidFill>
               </a:rPr>
-              <a:t>USJ -  Liban </a:t>
-            </a:r>
-            <a:r>
-              <a:rPr lang="ro-RO" sz="3200" dirty="0" smtClean="0">
-                <a:solidFill>
-                  <a:srgbClr val="FFFFFF"/>
-                </a:solidFill>
-              </a:rPr>
-              <a:t>du 30 </a:t>
-            </a:r>
-            <a:r>
-              <a:rPr lang="ro-RO" sz="3200" dirty="0" smtClean="0">
-                <a:solidFill>
-                  <a:srgbClr val="FFFFFF"/>
-                </a:solidFill>
-              </a:rPr>
-              <a:t>mai </a:t>
-            </a:r>
-            <a:r>
-              <a:rPr lang="ro-RO" sz="3200" dirty="0" smtClean="0">
-                <a:solidFill>
-                  <a:srgbClr val="FFFFFF"/>
-                </a:solidFill>
-              </a:rPr>
-              <a:t>au </a:t>
-            </a:r>
-            <a:r>
-              <a:rPr lang="ro-RO" sz="3200" dirty="0" smtClean="0">
-                <a:solidFill>
-                  <a:srgbClr val="FFFFFF"/>
-                </a:solidFill>
-              </a:rPr>
-              <a:t>19 août  2011</a:t>
+              <a:t>USJ -  Liban du 30 mai au 19 août  2011</a:t>
             </a:r>
             <a:endParaRPr lang="de-CH" sz="3200" dirty="0">
               <a:solidFill>
@@ -8199,9 +8261,74 @@
   <p:timing>
     <p:tnLst>
       <p:par>
-        <p:cTn xmlns:p14="http://schemas.microsoft.com/office/powerpoint/2010/main" id="1" dur="indefinite" restart="never" nodeType="tmRoot"/>
+        <p:cTn xmlns:p14="http://schemas.microsoft.com/office/powerpoint/2010/main" id="1" dur="indefinite" restart="never" nodeType="tmRoot">
+          <p:childTnLst>
+            <p:seq concurrent="1" nextAc="seek">
+              <p:cTn id="2" dur="indefinite" nodeType="mainSeq">
+                <p:childTnLst>
+                  <p:par>
+                    <p:cTn id="3" fill="hold">
+                      <p:stCondLst>
+                        <p:cond delay="indefinite"/>
+                      </p:stCondLst>
+                      <p:childTnLst>
+                        <p:par>
+                          <p:cTn id="4" fill="hold">
+                            <p:stCondLst>
+                              <p:cond delay="0"/>
+                            </p:stCondLst>
+                            <p:childTnLst>
+                              <p:par>
+                                <p:cTn id="5" presetID="0" presetClass="path" presetSubtype="0" accel="50000" decel="50000" fill="hold" grpId="0" nodeType="clickEffect">
+                                  <p:stCondLst>
+                                    <p:cond delay="0"/>
+                                  </p:stCondLst>
+                                  <p:childTnLst>
+                                    <p:animMotion origin="layout" path="M 5.55556E-6 5.55556E-6 L 5.55556E-6 -0.48333 " pathEditMode="relative" ptsTypes="AA">
+                                      <p:cBhvr>
+                                        <p:cTn id="6" dur="2000" fill="hold"/>
+                                        <p:tgtEl>
+                                          <p:spTgt spid="11"/>
+                                        </p:tgtEl>
+                                        <p:attrNameLst>
+                                          <p:attrName>ppt_x</p:attrName>
+                                          <p:attrName>ppt_y</p:attrName>
+                                        </p:attrNameLst>
+                                      </p:cBhvr>
+                                    </p:animMotion>
+                                  </p:childTnLst>
+                                </p:cTn>
+                              </p:par>
+                            </p:childTnLst>
+                          </p:cTn>
+                        </p:par>
+                      </p:childTnLst>
+                    </p:cTn>
+                  </p:par>
+                </p:childTnLst>
+              </p:cTn>
+              <p:prevCondLst>
+                <p:cond evt="onPrev" delay="0">
+                  <p:tgtEl>
+                    <p:sldTgt/>
+                  </p:tgtEl>
+                </p:cond>
+              </p:prevCondLst>
+              <p:nextCondLst>
+                <p:cond evt="onNext" delay="0">
+                  <p:tgtEl>
+                    <p:sldTgt/>
+                  </p:tgtEl>
+                </p:cond>
+              </p:nextCondLst>
+            </p:seq>
+          </p:childTnLst>
+        </p:cTn>
       </p:par>
     </p:tnLst>
+    <p:bldLst>
+      <p:bldP spid="11" grpId="0"/>
+    </p:bldLst>
   </p:timing>
 </p:sld>
 </file>
@@ -8691,15 +8818,7 @@
                   <a:srgbClr val="195B93"/>
                 </a:solidFill>
               </a:rPr>
-              <a:t>lus </a:t>
-            </a:r>
-            <a:r>
-              <a:rPr lang="fr-FR" b="1" dirty="0" smtClean="0">
-                <a:solidFill>
-                  <a:srgbClr val="195B93"/>
-                </a:solidFill>
-              </a:rPr>
-              <a:t>de 12000 étudiants</a:t>
+              <a:t>lus de 12000 étudiants</a:t>
             </a:r>
             <a:endParaRPr lang="fr-FR" dirty="0">
               <a:solidFill>
@@ -8734,15 +8853,7 @@
                   <a:srgbClr val="195B93"/>
                 </a:solidFill>
               </a:rPr>
-              <a:t>Duba</a:t>
-            </a:r>
-            <a:r>
-              <a:rPr lang="en-US" b="1" dirty="0" err="1" smtClean="0">
-                <a:solidFill>
-                  <a:srgbClr val="195B93"/>
-                </a:solidFill>
-              </a:rPr>
-              <a:t>ï</a:t>
+              <a:t>Dubaï</a:t>
             </a:r>
             <a:r>
               <a:rPr lang="fr-FR" b="1" dirty="0" smtClean="0">
@@ -10736,31 +10847,7 @@
                   <a:srgbClr val="27508B"/>
                 </a:solidFill>
               </a:rPr>
-              <a:t>Ergonomique </a:t>
-            </a:r>
-            <a:r>
-              <a:rPr lang="fr-FR" sz="2400" dirty="0" smtClean="0">
-                <a:solidFill>
-                  <a:srgbClr val="27508B"/>
-                </a:solidFill>
-              </a:rPr>
-              <a:t>et </a:t>
-            </a:r>
-            <a:r>
-              <a:rPr lang="fr-FR" sz="2400" dirty="0" smtClean="0">
-                <a:solidFill>
-                  <a:srgbClr val="27508B"/>
-                </a:solidFill>
-              </a:rPr>
-              <a:t>bon design </a:t>
-            </a:r>
-            <a:r>
-              <a:rPr lang="fr-FR" sz="2400" dirty="0" smtClean="0">
-                <a:solidFill>
-                  <a:srgbClr val="27508B"/>
-                </a:solidFill>
-              </a:rPr>
-              <a:t>graphique</a:t>
+              <a:t>Ergonomique et bon design graphique</a:t>
             </a:r>
           </a:p>
           <a:p>
@@ -10785,15 +10872,7 @@
                   <a:srgbClr val="27508B"/>
                 </a:solidFill>
               </a:rPr>
-              <a:t>Compatible </a:t>
-            </a:r>
-            <a:r>
-              <a:rPr lang="fr-FR" sz="2400" dirty="0" smtClean="0">
-                <a:solidFill>
-                  <a:srgbClr val="27508B"/>
-                </a:solidFill>
-              </a:rPr>
-              <a:t>iPhone/</a:t>
+              <a:t>Compatible iPhone/</a:t>
             </a:r>
             <a:r>
               <a:rPr lang="fr-FR" sz="2400" dirty="0" err="1" smtClean="0">
@@ -14349,11 +14428,6 @@
               </a:rPr>
               <a:t>Compatibilité</a:t>
             </a:r>
-            <a:endParaRPr lang="fr-FR" sz="1400" dirty="0">
-              <a:solidFill>
-                <a:srgbClr val="4189EF"/>
-              </a:solidFill>
-            </a:endParaRPr>
           </a:p>
         </p:txBody>
       </p:sp>
@@ -15131,11 +15205,6 @@
               </a:rPr>
               <a:t>Compatibilité</a:t>
             </a:r>
-            <a:endParaRPr lang="fr-FR" sz="1400" dirty="0">
-              <a:solidFill>
-                <a:srgbClr val="C1DAEF"/>
-              </a:solidFill>
-            </a:endParaRPr>
           </a:p>
         </p:txBody>
       </p:sp>

</xml_diff>